<commit_message>
Add and update diagrams
</commit_message>
<xml_diff>
--- a/docs/diagrams/AddModuleToStudentStagedTakenCommandUML.pptx
+++ b/docs/diagrams/AddModuleToStudentStagedTakenCommandUML.pptx
@@ -3495,8 +3495,8 @@
         </p:nvSpPr>
         <p:spPr>
           <a:xfrm>
-            <a:off x="2692994" y="2498819"/>
-            <a:ext cx="276038" cy="307777"/>
+            <a:off x="2623144" y="2498819"/>
+            <a:ext cx="443865" cy="306705"/>
           </a:xfrm>
           <a:prstGeom prst="rect">
             <a:avLst/>
@@ -3510,7 +3510,7 @@
           <a:p>
             <a:r>
               <a:rPr lang="en-US" sz="1400" dirty="0"/>
-              <a:t>1</a:t>
+              <a:t>1..*</a:t>
             </a:r>
             <a:endParaRPr lang="en-US" dirty="0"/>
           </a:p>

</xml_diff>

<commit_message>
Fix DG UML bug
</commit_message>
<xml_diff>
--- a/docs/diagrams/AddModuleToStudentStagedTakenCommandUML.pptx
+++ b/docs/diagrams/AddModuleToStudentStagedTakenCommandUML.pptx
@@ -3060,8 +3060,8 @@
         </p:nvSpPr>
         <p:spPr>
           <a:xfrm>
-            <a:off x="4195042" y="1317538"/>
-            <a:ext cx="1589103" cy="346760"/>
+            <a:off x="4194810" y="1168400"/>
+            <a:ext cx="1589405" cy="495935"/>
           </a:xfrm>
           <a:prstGeom prst="rect">
             <a:avLst/>
@@ -3086,6 +3086,22 @@
         <p:txBody>
           <a:bodyPr rtlCol="0" anchor="ctr"/>
           <a:lstStyle/>
+          <a:p>
+            <a:pPr algn="ctr"/>
+            <a:r>
+              <a:rPr lang="en-US" altLang="zh-CN" sz="1400" b="1" i="1" dirty="0">
+                <a:solidFill>
+                  <a:schemeClr val="bg1"/>
+                </a:solidFill>
+              </a:rPr>
+              <a:t>{abstract}</a:t>
+            </a:r>
+            <a:endParaRPr lang="en-US" sz="1400" b="1" i="1" dirty="0">
+              <a:solidFill>
+                <a:schemeClr val="bg1"/>
+              </a:solidFill>
+            </a:endParaRPr>
+          </a:p>
           <a:p>
             <a:pPr algn="ctr"/>
             <a:r>

</xml_diff>